<commit_message>
changes to slides from lessons 13 and 14
</commit_message>
<xml_diff>
--- a/instructors/13-Repositories_v3.0.pptx
+++ b/instructors/13-Repositories_v3.0.pptx
@@ -635,6 +635,156 @@
 </file>
 
 <file path=ppt/notesSlides/notesSlide2.xml><?xml version="1.0" encoding="utf-8"?>
+<p:notes xmlns:a="http://schemas.openxmlformats.org/drawingml/2006/main" xmlns:r="http://schemas.openxmlformats.org/officeDocument/2006/relationships" xmlns:p="http://schemas.openxmlformats.org/presentationml/2006/main">
+  <p:cSld>
+    <p:spTree>
+      <p:nvGrpSpPr>
+        <p:cNvPr id="1" name=""/>
+        <p:cNvGrpSpPr/>
+        <p:nvPr/>
+      </p:nvGrpSpPr>
+      <p:grpSpPr>
+        <a:xfrm>
+          <a:off x="0" y="0"/>
+          <a:ext cx="0" cy="0"/>
+          <a:chOff x="0" y="0"/>
+          <a:chExt cx="0" cy="0"/>
+        </a:xfrm>
+      </p:grpSpPr>
+      <p:sp>
+        <p:nvSpPr>
+          <p:cNvPr id="2" name="Slide Image Placeholder 1"/>
+          <p:cNvSpPr>
+            <a:spLocks noGrp="1" noRot="1" noChangeAspect="1"/>
+          </p:cNvSpPr>
+          <p:nvPr>
+            <p:ph type="sldImg"/>
+          </p:nvPr>
+        </p:nvSpPr>
+        <p:spPr/>
+      </p:sp>
+      <p:sp>
+        <p:nvSpPr>
+          <p:cNvPr id="3" name="Notes Placeholder 2"/>
+          <p:cNvSpPr>
+            <a:spLocks noGrp="1"/>
+          </p:cNvSpPr>
+          <p:nvPr>
+            <p:ph type="body" idx="1"/>
+          </p:nvPr>
+        </p:nvSpPr>
+        <p:spPr/>
+        <p:txBody>
+          <a:bodyPr/>
+          <a:lstStyle/>
+          <a:p>
+            <a:r>
+              <a:rPr lang="en-GB" dirty="0"/>
+              <a:t>Dryad is an international open-access repository of research data.  It is a </a:t>
+            </a:r>
+            <a:r>
+              <a:rPr lang="en-GB" dirty="0" err="1"/>
+              <a:t>nonprofit</a:t>
+            </a:r>
+            <a:r>
+              <a:rPr lang="en-GB" dirty="0"/>
+              <a:t> organization that provides long-term access to its contents at no cost to users. The base DPC per data submission is $120 USD. Access is free.</a:t>
+            </a:r>
+          </a:p>
+          <a:p>
+            <a:endParaRPr lang="en-GB" dirty="0"/>
+          </a:p>
+          <a:p>
+            <a:r>
+              <a:rPr lang="en-GB" dirty="0" err="1"/>
+              <a:t>Zenodo</a:t>
+            </a:r>
+            <a:r>
+              <a:rPr lang="en-GB" dirty="0"/>
+              <a:t> built and operated by CERN and </a:t>
+            </a:r>
+            <a:r>
+              <a:rPr lang="en-GB" dirty="0" err="1"/>
+              <a:t>OpenAIRE</a:t>
+            </a:r>
+            <a:r>
+              <a:rPr lang="en-GB" dirty="0"/>
+              <a:t> to ensure that everyone can join in Open Science.</a:t>
+            </a:r>
+          </a:p>
+          <a:p>
+            <a:endParaRPr lang="en-GB" dirty="0"/>
+          </a:p>
+          <a:p>
+            <a:r>
+              <a:rPr lang="en-GB" dirty="0" err="1"/>
+              <a:t>Figshare</a:t>
+            </a:r>
+            <a:r>
+              <a:rPr lang="en-GB" dirty="0"/>
+              <a:t> is an online open access repository where researchers can preserve and share their research outputs, including figures, datasets, images, and videos. It is free to upload content and free to access, in adherence to the principle of open data. </a:t>
+            </a:r>
+            <a:r>
+              <a:rPr lang="en-GB" dirty="0" err="1"/>
+              <a:t>Figshare</a:t>
+            </a:r>
+            <a:r>
+              <a:rPr lang="en-GB" dirty="0"/>
+              <a:t> is one of a number of portfolio businesses supported by Digital Science, a subsidiary of Springer Nature.</a:t>
+            </a:r>
+          </a:p>
+          <a:p>
+            <a:endParaRPr lang="en-GB" dirty="0"/>
+          </a:p>
+          <a:p>
+            <a:r>
+              <a:rPr lang="en-GB" dirty="0" err="1"/>
+              <a:t>Dataverse</a:t>
+            </a:r>
+            <a:r>
+              <a:rPr lang="en-GB" dirty="0"/>
+              <a:t> is funded by Harvard with additional support from the Alfred P. Sloan Foundation, National Science Foundation, National Institutes of Health, Helmsley Charitable Trust, IQSS's Henry A. Murray Research Archive, and many others. </a:t>
+            </a:r>
+          </a:p>
+        </p:txBody>
+      </p:sp>
+      <p:sp>
+        <p:nvSpPr>
+          <p:cNvPr id="4" name="Slide Number Placeholder 3"/>
+          <p:cNvSpPr>
+            <a:spLocks noGrp="1"/>
+          </p:cNvSpPr>
+          <p:nvPr>
+            <p:ph type="sldNum" sz="quarter" idx="5"/>
+          </p:nvPr>
+        </p:nvSpPr>
+        <p:spPr/>
+        <p:txBody>
+          <a:bodyPr/>
+          <a:lstStyle/>
+          <a:p>
+            <a:fld id="{B361C124-7373-F149-A166-BB8240B9FE77}" type="slidenum">
+              <a:rPr lang="en-GB" smtClean="0"/>
+              <a:t>5</a:t>
+            </a:fld>
+            <a:endParaRPr lang="en-GB"/>
+          </a:p>
+        </p:txBody>
+      </p:sp>
+    </p:spTree>
+    <p:extLst>
+      <p:ext uri="{BB962C8B-B14F-4D97-AF65-F5344CB8AC3E}">
+        <p14:creationId xmlns:p14="http://schemas.microsoft.com/office/powerpoint/2010/main" val="2742857717"/>
+      </p:ext>
+    </p:extLst>
+  </p:cSld>
+  <p:clrMapOvr>
+    <a:masterClrMapping/>
+  </p:clrMapOvr>
+</p:notes>
+</file>
+
+<file path=ppt/notesSlides/notesSlide3.xml><?xml version="1.0" encoding="utf-8"?>
 <p:notes xmlns:a="http://schemas.openxmlformats.org/drawingml/2006/main" xmlns:r="http://schemas.openxmlformats.org/officeDocument/2006/relationships" xmlns:p="http://schemas.openxmlformats.org/presentationml/2006/main">
   <p:cSld>
     <p:spTree>
@@ -4768,8 +4918,8 @@
         </p:nvSpPr>
         <p:spPr>
           <a:xfrm>
-            <a:off x="1205802" y="2722993"/>
-            <a:ext cx="10158884" cy="1200329"/>
+            <a:off x="838200" y="2649841"/>
+            <a:ext cx="10827702" cy="1200329"/>
           </a:xfrm>
           <a:prstGeom prst="rect">
             <a:avLst/>
@@ -4818,7 +4968,7 @@
                 <a:effectLst/>
                 <a:latin typeface="Ubuntu"/>
               </a:rPr>
-              <a:t>However, it is not good for discovery, and does not enforce most metadata!</a:t>
+              <a:t>However, it is not (always) good for discovery, and does not enforce most metadata!</a:t>
             </a:r>
             <a:endParaRPr lang="en-GB" sz="2400" dirty="0"/>
           </a:p>
@@ -9064,7 +9214,7 @@
           <p:nvPr/>
         </p:nvPicPr>
         <p:blipFill>
-          <a:blip r:embed="rId2" cstate="hqprint">
+          <a:blip r:embed="rId3" cstate="hqprint">
             <a:extLst>
               <a:ext uri="{28A0092B-C50C-407E-A947-70E740481C1C}">
                 <a14:useLocalDpi xmlns:a14="http://schemas.microsoft.com/office/drawing/2010/main" val="0"/>
@@ -9137,7 +9287,7 @@
                 <a:solidFill>
                   <a:srgbClr val="0070C0"/>
                 </a:solidFill>
-                <a:hlinkClick r:id="rId3"/>
+                <a:hlinkClick r:id="rId4"/>
               </a:rPr>
               <a:t>http://datadryad.org</a:t>
             </a:r>
@@ -9192,7 +9342,7 @@
                 <a:solidFill>
                   <a:srgbClr val="0070C0"/>
                 </a:solidFill>
-                <a:hlinkClick r:id="rId4"/>
+                <a:hlinkClick r:id="rId5"/>
               </a:rPr>
               <a:t>http://zenodo.org</a:t>
             </a:r>
@@ -9247,7 +9397,7 @@
                 <a:solidFill>
                   <a:srgbClr val="0070C0"/>
                 </a:solidFill>
-                <a:hlinkClick r:id="rId5"/>
+                <a:hlinkClick r:id="rId6"/>
               </a:rPr>
               <a:t>http://figshare.com</a:t>
             </a:r>
@@ -9302,7 +9452,7 @@
                 <a:solidFill>
                   <a:srgbClr val="0070C0"/>
                 </a:solidFill>
-                <a:hlinkClick r:id="rId6"/>
+                <a:hlinkClick r:id="rId7"/>
               </a:rPr>
               <a:t>http://dataverse.org</a:t>
             </a:r>
@@ -9365,7 +9515,7 @@
           <p:nvPr/>
         </p:nvPicPr>
         <p:blipFill>
-          <a:blip r:embed="rId7">
+          <a:blip r:embed="rId8">
             <a:extLst>
               <a:ext uri="{28A0092B-C50C-407E-A947-70E740481C1C}">
                 <a14:useLocalDpi xmlns:a14="http://schemas.microsoft.com/office/drawing/2010/main" val="0"/>
@@ -9412,7 +9562,7 @@
           <p:nvPr/>
         </p:nvPicPr>
         <p:blipFill>
-          <a:blip r:embed="rId8">
+          <a:blip r:embed="rId9">
             <a:extLst>
               <a:ext uri="{28A0092B-C50C-407E-A947-70E740481C1C}">
                 <a14:useLocalDpi xmlns:a14="http://schemas.microsoft.com/office/drawing/2010/main" val="0"/>
@@ -9459,7 +9609,7 @@
           <p:nvPr/>
         </p:nvPicPr>
         <p:blipFill>
-          <a:blip r:embed="rId9">
+          <a:blip r:embed="rId10">
             <a:extLst>
               <a:ext uri="{28A0092B-C50C-407E-A947-70E740481C1C}">
                 <a14:useLocalDpi xmlns:a14="http://schemas.microsoft.com/office/drawing/2010/main" val="0"/>
@@ -9506,7 +9656,7 @@
           <p:nvPr/>
         </p:nvPicPr>
         <p:blipFill>
-          <a:blip r:embed="rId10">
+          <a:blip r:embed="rId11">
             <a:extLst>
               <a:ext uri="{28A0092B-C50C-407E-A947-70E740481C1C}">
                 <a14:useLocalDpi xmlns:a14="http://schemas.microsoft.com/office/drawing/2010/main" val="0"/>

</xml_diff>